<commit_message>
Refactor code to calculate student count by grade level
</commit_message>
<xml_diff>
--- a/实验/实验一/Python实验一.pptx
+++ b/实验/实验一/Python实验一.pptx
@@ -5,20 +5,20 @@
     <p:sldMasterId id="2147483648" r:id="rId1"/>
   </p:sldMasterIdLst>
   <p:sldIdLst>
-    <p:sldId id="256" r:id="rId3"/>
-    <p:sldId id="257" r:id="rId4"/>
-    <p:sldId id="258" r:id="rId5"/>
-    <p:sldId id="259" r:id="rId6"/>
-    <p:sldId id="260" r:id="rId7"/>
-    <p:sldId id="261" r:id="rId8"/>
-    <p:sldId id="262" r:id="rId9"/>
-    <p:sldId id="263" r:id="rId10"/>
-    <p:sldId id="264" r:id="rId11"/>
+    <p:sldId id="256" r:id="rId2"/>
+    <p:sldId id="257" r:id="rId3"/>
+    <p:sldId id="258" r:id="rId4"/>
+    <p:sldId id="259" r:id="rId5"/>
+    <p:sldId id="260" r:id="rId6"/>
+    <p:sldId id="261" r:id="rId7"/>
+    <p:sldId id="262" r:id="rId8"/>
+    <p:sldId id="263" r:id="rId9"/>
+    <p:sldId id="264" r:id="rId10"/>
   </p:sldIdLst>
   <p:sldSz cx="9144000" cy="6858000" type="screen4x3"/>
   <p:notesSz cx="6858000" cy="9144000"/>
   <p:custDataLst>
-    <p:tags r:id="rId15"/>
+    <p:tags r:id="rId11"/>
   </p:custDataLst>
   <p:defaultTextStyle>
     <a:defPPr>
@@ -205,11 +205,27 @@
       </a:defRPr>
     </a:lvl9pPr>
   </p:defaultTextStyle>
+  <p:extLst>
+    <p:ext uri="{EFAFB233-063F-42B5-8137-9DF3F51BA10A}">
+      <p15:sldGuideLst xmlns:p15="http://schemas.microsoft.com/office/powerpoint/2012/main">
+        <p15:guide id="1" orient="horz" pos="2160">
+          <p15:clr>
+            <a:srgbClr val="A4A3A4"/>
+          </p15:clr>
+        </p15:guide>
+        <p15:guide id="2" pos="2880">
+          <p15:clr>
+            <a:srgbClr val="A4A3A4"/>
+          </p15:clr>
+        </p15:guide>
+      </p15:sldGuideLst>
+    </p:ext>
+  </p:extLst>
 </p:presentation>
 </file>
 
 <file path=ppt/slideLayouts/slideLayout1.xml><?xml version="1.0" encoding="utf-8"?>
-<p:sldLayout xmlns:a="http://schemas.openxmlformats.org/drawingml/2006/main" xmlns:r="http://schemas.openxmlformats.org/officeDocument/2006/relationships" xmlns:p="http://schemas.openxmlformats.org/presentationml/2006/main" type="title" showMasterPhAnim="0" showMasterSp="0">
+<p:sldLayout xmlns:a="http://schemas.openxmlformats.org/drawingml/2006/main" xmlns:r="http://schemas.openxmlformats.org/officeDocument/2006/relationships" xmlns:p="http://schemas.openxmlformats.org/presentationml/2006/main" showMasterSp="0" showMasterPhAnim="0" type="title">
   <p:cSld name="标题幻灯片">
     <p:bg>
       <p:bgPr>
@@ -230,7 +246,14 @@
         <p:cNvGrpSpPr/>
         <p:nvPr/>
       </p:nvGrpSpPr>
-      <p:grpSpPr/>
+      <p:grpSpPr>
+        <a:xfrm>
+          <a:off x="0" y="0"/>
+          <a:ext cx="0" cy="0"/>
+          <a:chOff x="0" y="0"/>
+          <a:chExt cx="0" cy="0"/>
+        </a:xfrm>
+      </p:grpSpPr>
       <p:sp>
         <p:nvSpPr>
           <p:cNvPr id="13314" name="标题 13313"/>
@@ -270,7 +293,6 @@
               <a:rPr lang="zh-CN" altLang="en-US" dirty="0"/>
               <a:t>单击此处编辑母版标题样式</a:t>
             </a:r>
-            <a:endParaRPr lang="zh-CN" altLang="en-US" dirty="0"/>
           </a:p>
         </p:txBody>
       </p:sp>
@@ -352,7 +374,6 @@
               <a:rPr lang="zh-CN" altLang="en-US" dirty="0"/>
               <a:t>单击此处编辑母版副标题样式</a:t>
             </a:r>
-            <a:endParaRPr lang="zh-CN" altLang="en-US" dirty="0"/>
           </a:p>
         </p:txBody>
       </p:sp>
@@ -467,6 +488,7 @@
           <a:p>
             <a:fld id="{9A0DB2DC-4C9A-4742-B13C-FB6460FD3503}" type="slidenum">
               <a:rPr lang="zh-CN" altLang="en-US" dirty="0"/>
+              <a:t>‹#›</a:t>
             </a:fld>
             <a:endParaRPr lang="zh-CN" altLang="en-US" dirty="0">
               <a:latin typeface="Arial" panose="020B0604020202020204" pitchFamily="34" charset="0"/>
@@ -494,6 +516,7 @@
             </a:gdLst>
             <a:ahLst/>
             <a:cxnLst/>
+            <a:rect l="0" t="0" r="0" b="0"/>
             <a:pathLst>
               <a:path w="1000" h="1000" stroke="0">
                 <a:moveTo>
@@ -535,6 +558,7 @@
         </p:spPr>
         <p:txBody>
           <a:bodyPr/>
+          <a:lstStyle/>
           <a:p>
             <a:pPr lvl="0"/>
             <a:endParaRPr sz="2400" dirty="0">
@@ -585,10 +609,9 @@
           <a:lstStyle/>
           <a:p>
             <a:r>
-              <a:rPr lang="zh-CN" altLang="en-US" smtClean="0"/>
+              <a:rPr lang="zh-CN" altLang="en-US"/>
               <a:t>单击此处编辑母版标题样式</a:t>
             </a:r>
-            <a:endParaRPr lang="zh-CN" altLang="en-US"/>
           </a:p>
         </p:txBody>
       </p:sp>
@@ -609,42 +632,37 @@
           <a:p>
             <a:pPr lvl="0"/>
             <a:r>
-              <a:rPr lang="zh-CN" altLang="en-US" smtClean="0"/>
+              <a:rPr lang="zh-CN" altLang="en-US"/>
               <a:t>单击此处编辑母版文本样式</a:t>
             </a:r>
-            <a:endParaRPr lang="zh-CN" altLang="en-US" smtClean="0"/>
           </a:p>
           <a:p>
             <a:pPr lvl="1"/>
             <a:r>
-              <a:rPr lang="zh-CN" altLang="en-US" smtClean="0"/>
+              <a:rPr lang="zh-CN" altLang="en-US"/>
               <a:t>第二级</a:t>
             </a:r>
-            <a:endParaRPr lang="zh-CN" altLang="en-US" smtClean="0"/>
           </a:p>
           <a:p>
             <a:pPr lvl="2"/>
             <a:r>
-              <a:rPr lang="zh-CN" altLang="en-US" smtClean="0"/>
+              <a:rPr lang="zh-CN" altLang="en-US"/>
               <a:t>第三级</a:t>
             </a:r>
-            <a:endParaRPr lang="zh-CN" altLang="en-US" smtClean="0"/>
           </a:p>
           <a:p>
             <a:pPr lvl="3"/>
             <a:r>
-              <a:rPr lang="zh-CN" altLang="en-US" smtClean="0"/>
+              <a:rPr lang="zh-CN" altLang="en-US"/>
               <a:t>第四级</a:t>
             </a:r>
-            <a:endParaRPr lang="zh-CN" altLang="en-US" smtClean="0"/>
           </a:p>
           <a:p>
             <a:pPr lvl="4"/>
             <a:r>
-              <a:rPr lang="zh-CN" altLang="en-US" smtClean="0"/>
+              <a:rPr lang="zh-CN" altLang="en-US"/>
               <a:t>第五级</a:t>
             </a:r>
-            <a:endParaRPr lang="zh-CN" altLang="en-US"/>
           </a:p>
         </p:txBody>
       </p:sp>
@@ -708,6 +726,7 @@
             <a:pPr lvl="0"/>
             <a:fld id="{9A0DB2DC-4C9A-4742-B13C-FB6460FD3503}" type="slidenum">
               <a:rPr lang="zh-CN" altLang="en-US" dirty="0"/>
+              <a:t>‹#›</a:t>
             </a:fld>
             <a:endParaRPr lang="zh-CN" altLang="en-US" dirty="0">
               <a:latin typeface="Arial" panose="020B0604020202020204" pitchFamily="34" charset="0"/>
@@ -761,10 +780,9 @@
           <a:lstStyle/>
           <a:p>
             <a:r>
-              <a:rPr lang="zh-CN" altLang="en-US" smtClean="0"/>
+              <a:rPr lang="zh-CN" altLang="en-US"/>
               <a:t>单击此处编辑母版标题样式</a:t>
             </a:r>
-            <a:endParaRPr lang="zh-CN" altLang="en-US"/>
           </a:p>
         </p:txBody>
       </p:sp>
@@ -790,42 +808,37 @@
           <a:p>
             <a:pPr lvl="0"/>
             <a:r>
-              <a:rPr lang="zh-CN" altLang="en-US" smtClean="0"/>
+              <a:rPr lang="zh-CN" altLang="en-US"/>
               <a:t>单击此处编辑母版文本样式</a:t>
             </a:r>
-            <a:endParaRPr lang="zh-CN" altLang="en-US" smtClean="0"/>
           </a:p>
           <a:p>
             <a:pPr lvl="1"/>
             <a:r>
-              <a:rPr lang="zh-CN" altLang="en-US" smtClean="0"/>
+              <a:rPr lang="zh-CN" altLang="en-US"/>
               <a:t>第二级</a:t>
             </a:r>
-            <a:endParaRPr lang="zh-CN" altLang="en-US" smtClean="0"/>
           </a:p>
           <a:p>
             <a:pPr lvl="2"/>
             <a:r>
-              <a:rPr lang="zh-CN" altLang="en-US" smtClean="0"/>
+              <a:rPr lang="zh-CN" altLang="en-US"/>
               <a:t>第三级</a:t>
             </a:r>
-            <a:endParaRPr lang="zh-CN" altLang="en-US" smtClean="0"/>
           </a:p>
           <a:p>
             <a:pPr lvl="3"/>
             <a:r>
-              <a:rPr lang="zh-CN" altLang="en-US" smtClean="0"/>
+              <a:rPr lang="zh-CN" altLang="en-US"/>
               <a:t>第四级</a:t>
             </a:r>
-            <a:endParaRPr lang="zh-CN" altLang="en-US" smtClean="0"/>
           </a:p>
           <a:p>
             <a:pPr lvl="4"/>
             <a:r>
-              <a:rPr lang="zh-CN" altLang="en-US" smtClean="0"/>
+              <a:rPr lang="zh-CN" altLang="en-US"/>
               <a:t>第五级</a:t>
             </a:r>
-            <a:endParaRPr lang="zh-CN" altLang="en-US"/>
           </a:p>
         </p:txBody>
       </p:sp>
@@ -889,6 +902,7 @@
             <a:pPr lvl="0"/>
             <a:fld id="{9A0DB2DC-4C9A-4742-B13C-FB6460FD3503}" type="slidenum">
               <a:rPr lang="zh-CN" altLang="en-US" dirty="0"/>
+              <a:t>‹#›</a:t>
             </a:fld>
             <a:endParaRPr lang="zh-CN" altLang="en-US" dirty="0">
               <a:latin typeface="Arial" panose="020B0604020202020204" pitchFamily="34" charset="0"/>
@@ -937,10 +951,9 @@
           <a:lstStyle/>
           <a:p>
             <a:r>
-              <a:rPr lang="zh-CN" altLang="en-US" smtClean="0"/>
+              <a:rPr lang="zh-CN" altLang="en-US"/>
               <a:t>单击此处编辑母版标题样式</a:t>
             </a:r>
-            <a:endParaRPr lang="zh-CN" altLang="en-US"/>
           </a:p>
         </p:txBody>
       </p:sp>
@@ -961,42 +974,37 @@
           <a:p>
             <a:pPr lvl="0"/>
             <a:r>
-              <a:rPr lang="zh-CN" altLang="en-US" smtClean="0"/>
+              <a:rPr lang="zh-CN" altLang="en-US"/>
               <a:t>单击此处编辑母版文本样式</a:t>
             </a:r>
-            <a:endParaRPr lang="zh-CN" altLang="en-US" smtClean="0"/>
           </a:p>
           <a:p>
             <a:pPr lvl="1"/>
             <a:r>
-              <a:rPr lang="zh-CN" altLang="en-US" smtClean="0"/>
+              <a:rPr lang="zh-CN" altLang="en-US"/>
               <a:t>第二级</a:t>
             </a:r>
-            <a:endParaRPr lang="zh-CN" altLang="en-US" smtClean="0"/>
           </a:p>
           <a:p>
             <a:pPr lvl="2"/>
             <a:r>
-              <a:rPr lang="zh-CN" altLang="en-US" smtClean="0"/>
+              <a:rPr lang="zh-CN" altLang="en-US"/>
               <a:t>第三级</a:t>
             </a:r>
-            <a:endParaRPr lang="zh-CN" altLang="en-US" smtClean="0"/>
           </a:p>
           <a:p>
             <a:pPr lvl="3"/>
             <a:r>
-              <a:rPr lang="zh-CN" altLang="en-US" smtClean="0"/>
+              <a:rPr lang="zh-CN" altLang="en-US"/>
               <a:t>第四级</a:t>
             </a:r>
-            <a:endParaRPr lang="zh-CN" altLang="en-US" smtClean="0"/>
           </a:p>
           <a:p>
             <a:pPr lvl="4"/>
             <a:r>
-              <a:rPr lang="zh-CN" altLang="en-US" smtClean="0"/>
+              <a:rPr lang="zh-CN" altLang="en-US"/>
               <a:t>第五级</a:t>
             </a:r>
-            <a:endParaRPr lang="zh-CN" altLang="en-US"/>
           </a:p>
         </p:txBody>
       </p:sp>
@@ -1060,6 +1068,7 @@
             <a:pPr lvl="0"/>
             <a:fld id="{9A0DB2DC-4C9A-4742-B13C-FB6460FD3503}" type="slidenum">
               <a:rPr lang="zh-CN" altLang="en-US" dirty="0"/>
+              <a:t>‹#›</a:t>
             </a:fld>
             <a:endParaRPr lang="zh-CN" altLang="en-US" dirty="0">
               <a:latin typeface="Arial" panose="020B0604020202020204" pitchFamily="34" charset="0"/>
@@ -1117,10 +1126,9 @@
           </a:lstStyle>
           <a:p>
             <a:r>
-              <a:rPr lang="zh-CN" altLang="en-US" smtClean="0"/>
+              <a:rPr lang="zh-CN" altLang="en-US"/>
               <a:t>单击此处编辑母版标题样式</a:t>
             </a:r>
-            <a:endParaRPr lang="zh-CN" altLang="en-US"/>
           </a:p>
         </p:txBody>
       </p:sp>
@@ -1237,10 +1245,9 @@
           <a:p>
             <a:pPr lvl="0"/>
             <a:r>
-              <a:rPr lang="zh-CN" altLang="en-US" smtClean="0"/>
+              <a:rPr lang="zh-CN" altLang="en-US"/>
               <a:t>单击此处编辑母版文本样式</a:t>
             </a:r>
-            <a:endParaRPr lang="zh-CN" altLang="en-US" smtClean="0"/>
           </a:p>
         </p:txBody>
       </p:sp>
@@ -1304,6 +1311,7 @@
             <a:pPr lvl="0"/>
             <a:fld id="{9A0DB2DC-4C9A-4742-B13C-FB6460FD3503}" type="slidenum">
               <a:rPr lang="zh-CN" altLang="en-US" dirty="0"/>
+              <a:t>‹#›</a:t>
             </a:fld>
             <a:endParaRPr lang="zh-CN" altLang="en-US" dirty="0">
               <a:latin typeface="Arial" panose="020B0604020202020204" pitchFamily="34" charset="0"/>
@@ -1352,10 +1360,9 @@
           <a:lstStyle/>
           <a:p>
             <a:r>
-              <a:rPr lang="zh-CN" altLang="en-US" smtClean="0"/>
+              <a:rPr lang="zh-CN" altLang="en-US"/>
               <a:t>单击此处编辑母版标题样式</a:t>
             </a:r>
-            <a:endParaRPr lang="zh-CN" altLang="en-US"/>
           </a:p>
         </p:txBody>
       </p:sp>
@@ -1381,42 +1388,37 @@
           <a:p>
             <a:pPr lvl="0"/>
             <a:r>
-              <a:rPr lang="zh-CN" altLang="en-US" smtClean="0"/>
+              <a:rPr lang="zh-CN" altLang="en-US"/>
               <a:t>单击此处编辑母版文本样式</a:t>
             </a:r>
-            <a:endParaRPr lang="zh-CN" altLang="en-US" smtClean="0"/>
           </a:p>
           <a:p>
             <a:pPr lvl="1"/>
             <a:r>
-              <a:rPr lang="zh-CN" altLang="en-US" smtClean="0"/>
+              <a:rPr lang="zh-CN" altLang="en-US"/>
               <a:t>第二级</a:t>
             </a:r>
-            <a:endParaRPr lang="zh-CN" altLang="en-US" smtClean="0"/>
           </a:p>
           <a:p>
             <a:pPr lvl="2"/>
             <a:r>
-              <a:rPr lang="zh-CN" altLang="en-US" smtClean="0"/>
+              <a:rPr lang="zh-CN" altLang="en-US"/>
               <a:t>第三级</a:t>
             </a:r>
-            <a:endParaRPr lang="zh-CN" altLang="en-US" smtClean="0"/>
           </a:p>
           <a:p>
             <a:pPr lvl="3"/>
             <a:r>
-              <a:rPr lang="zh-CN" altLang="en-US" smtClean="0"/>
+              <a:rPr lang="zh-CN" altLang="en-US"/>
               <a:t>第四级</a:t>
             </a:r>
-            <a:endParaRPr lang="zh-CN" altLang="en-US" smtClean="0"/>
           </a:p>
           <a:p>
             <a:pPr lvl="4"/>
             <a:r>
-              <a:rPr lang="zh-CN" altLang="en-US" smtClean="0"/>
+              <a:rPr lang="zh-CN" altLang="en-US"/>
               <a:t>第五级</a:t>
             </a:r>
-            <a:endParaRPr lang="zh-CN" altLang="en-US"/>
           </a:p>
         </p:txBody>
       </p:sp>
@@ -1442,42 +1444,37 @@
           <a:p>
             <a:pPr lvl="0"/>
             <a:r>
-              <a:rPr lang="zh-CN" altLang="en-US" smtClean="0"/>
+              <a:rPr lang="zh-CN" altLang="en-US"/>
               <a:t>单击此处编辑母版文本样式</a:t>
             </a:r>
-            <a:endParaRPr lang="zh-CN" altLang="en-US" smtClean="0"/>
           </a:p>
           <a:p>
             <a:pPr lvl="1"/>
             <a:r>
-              <a:rPr lang="zh-CN" altLang="en-US" smtClean="0"/>
+              <a:rPr lang="zh-CN" altLang="en-US"/>
               <a:t>第二级</a:t>
             </a:r>
-            <a:endParaRPr lang="zh-CN" altLang="en-US" smtClean="0"/>
           </a:p>
           <a:p>
             <a:pPr lvl="2"/>
             <a:r>
-              <a:rPr lang="zh-CN" altLang="en-US" smtClean="0"/>
+              <a:rPr lang="zh-CN" altLang="en-US"/>
               <a:t>第三级</a:t>
             </a:r>
-            <a:endParaRPr lang="zh-CN" altLang="en-US" smtClean="0"/>
           </a:p>
           <a:p>
             <a:pPr lvl="3"/>
             <a:r>
-              <a:rPr lang="zh-CN" altLang="en-US" smtClean="0"/>
+              <a:rPr lang="zh-CN" altLang="en-US"/>
               <a:t>第四级</a:t>
             </a:r>
-            <a:endParaRPr lang="zh-CN" altLang="en-US" smtClean="0"/>
           </a:p>
           <a:p>
             <a:pPr lvl="4"/>
             <a:r>
-              <a:rPr lang="zh-CN" altLang="en-US" smtClean="0"/>
+              <a:rPr lang="zh-CN" altLang="en-US"/>
               <a:t>第五级</a:t>
             </a:r>
-            <a:endParaRPr lang="zh-CN" altLang="en-US"/>
           </a:p>
         </p:txBody>
       </p:sp>
@@ -1541,6 +1538,7 @@
             <a:pPr lvl="0"/>
             <a:fld id="{9A0DB2DC-4C9A-4742-B13C-FB6460FD3503}" type="slidenum">
               <a:rPr lang="zh-CN" altLang="en-US" dirty="0"/>
+              <a:t>‹#›</a:t>
             </a:fld>
             <a:endParaRPr lang="zh-CN" altLang="en-US" dirty="0">
               <a:latin typeface="Arial" panose="020B0604020202020204" pitchFamily="34" charset="0"/>
@@ -1594,10 +1592,9 @@
           <a:lstStyle/>
           <a:p>
             <a:r>
-              <a:rPr lang="zh-CN" altLang="en-US" smtClean="0"/>
+              <a:rPr lang="zh-CN" altLang="en-US"/>
               <a:t>单击此处编辑母版标题样式</a:t>
             </a:r>
-            <a:endParaRPr lang="zh-CN" altLang="en-US"/>
           </a:p>
         </p:txBody>
       </p:sp>
@@ -1660,10 +1657,9 @@
           <a:p>
             <a:pPr lvl="0"/>
             <a:r>
-              <a:rPr lang="zh-CN" altLang="en-US" smtClean="0"/>
+              <a:rPr lang="zh-CN" altLang="en-US"/>
               <a:t>单击此处编辑母版文本样式</a:t>
             </a:r>
-            <a:endParaRPr lang="zh-CN" altLang="en-US" smtClean="0"/>
           </a:p>
         </p:txBody>
       </p:sp>
@@ -1689,42 +1685,37 @@
           <a:p>
             <a:pPr lvl="0"/>
             <a:r>
-              <a:rPr lang="zh-CN" altLang="en-US" smtClean="0"/>
+              <a:rPr lang="zh-CN" altLang="en-US"/>
               <a:t>单击此处编辑母版文本样式</a:t>
             </a:r>
-            <a:endParaRPr lang="zh-CN" altLang="en-US" smtClean="0"/>
           </a:p>
           <a:p>
             <a:pPr lvl="1"/>
             <a:r>
-              <a:rPr lang="zh-CN" altLang="en-US" smtClean="0"/>
+              <a:rPr lang="zh-CN" altLang="en-US"/>
               <a:t>第二级</a:t>
             </a:r>
-            <a:endParaRPr lang="zh-CN" altLang="en-US" smtClean="0"/>
           </a:p>
           <a:p>
             <a:pPr lvl="2"/>
             <a:r>
-              <a:rPr lang="zh-CN" altLang="en-US" smtClean="0"/>
+              <a:rPr lang="zh-CN" altLang="en-US"/>
               <a:t>第三级</a:t>
             </a:r>
-            <a:endParaRPr lang="zh-CN" altLang="en-US" smtClean="0"/>
           </a:p>
           <a:p>
             <a:pPr lvl="3"/>
             <a:r>
-              <a:rPr lang="zh-CN" altLang="en-US" smtClean="0"/>
+              <a:rPr lang="zh-CN" altLang="en-US"/>
               <a:t>第四级</a:t>
             </a:r>
-            <a:endParaRPr lang="zh-CN" altLang="en-US" smtClean="0"/>
           </a:p>
           <a:p>
             <a:pPr lvl="4"/>
             <a:r>
-              <a:rPr lang="zh-CN" altLang="en-US" smtClean="0"/>
+              <a:rPr lang="zh-CN" altLang="en-US"/>
               <a:t>第五级</a:t>
             </a:r>
-            <a:endParaRPr lang="zh-CN" altLang="en-US"/>
           </a:p>
         </p:txBody>
       </p:sp>
@@ -1787,10 +1778,9 @@
           <a:p>
             <a:pPr lvl="0"/>
             <a:r>
-              <a:rPr lang="zh-CN" altLang="en-US" smtClean="0"/>
+              <a:rPr lang="zh-CN" altLang="en-US"/>
               <a:t>单击此处编辑母版文本样式</a:t>
             </a:r>
-            <a:endParaRPr lang="zh-CN" altLang="en-US" smtClean="0"/>
           </a:p>
         </p:txBody>
       </p:sp>
@@ -1816,42 +1806,37 @@
           <a:p>
             <a:pPr lvl="0"/>
             <a:r>
-              <a:rPr lang="zh-CN" altLang="en-US" smtClean="0"/>
+              <a:rPr lang="zh-CN" altLang="en-US"/>
               <a:t>单击此处编辑母版文本样式</a:t>
             </a:r>
-            <a:endParaRPr lang="zh-CN" altLang="en-US" smtClean="0"/>
           </a:p>
           <a:p>
             <a:pPr lvl="1"/>
             <a:r>
-              <a:rPr lang="zh-CN" altLang="en-US" smtClean="0"/>
+              <a:rPr lang="zh-CN" altLang="en-US"/>
               <a:t>第二级</a:t>
             </a:r>
-            <a:endParaRPr lang="zh-CN" altLang="en-US" smtClean="0"/>
           </a:p>
           <a:p>
             <a:pPr lvl="2"/>
             <a:r>
-              <a:rPr lang="zh-CN" altLang="en-US" smtClean="0"/>
+              <a:rPr lang="zh-CN" altLang="en-US"/>
               <a:t>第三级</a:t>
             </a:r>
-            <a:endParaRPr lang="zh-CN" altLang="en-US" smtClean="0"/>
           </a:p>
           <a:p>
             <a:pPr lvl="3"/>
             <a:r>
-              <a:rPr lang="zh-CN" altLang="en-US" smtClean="0"/>
+              <a:rPr lang="zh-CN" altLang="en-US"/>
               <a:t>第四级</a:t>
             </a:r>
-            <a:endParaRPr lang="zh-CN" altLang="en-US" smtClean="0"/>
           </a:p>
           <a:p>
             <a:pPr lvl="4"/>
             <a:r>
-              <a:rPr lang="zh-CN" altLang="en-US" smtClean="0"/>
+              <a:rPr lang="zh-CN" altLang="en-US"/>
               <a:t>第五级</a:t>
             </a:r>
-            <a:endParaRPr lang="zh-CN" altLang="en-US"/>
           </a:p>
         </p:txBody>
       </p:sp>
@@ -1915,6 +1900,7 @@
             <a:pPr lvl="0"/>
             <a:fld id="{9A0DB2DC-4C9A-4742-B13C-FB6460FD3503}" type="slidenum">
               <a:rPr lang="zh-CN" altLang="en-US" dirty="0"/>
+              <a:t>‹#›</a:t>
             </a:fld>
             <a:endParaRPr lang="zh-CN" altLang="en-US" dirty="0">
               <a:latin typeface="Arial" panose="020B0604020202020204" pitchFamily="34" charset="0"/>
@@ -1963,10 +1949,9 @@
           <a:lstStyle/>
           <a:p>
             <a:r>
-              <a:rPr lang="zh-CN" altLang="en-US" smtClean="0"/>
+              <a:rPr lang="zh-CN" altLang="en-US"/>
               <a:t>单击此处编辑母版标题样式</a:t>
             </a:r>
-            <a:endParaRPr lang="zh-CN" altLang="en-US"/>
           </a:p>
         </p:txBody>
       </p:sp>
@@ -2030,6 +2015,7 @@
             <a:pPr lvl="0"/>
             <a:fld id="{9A0DB2DC-4C9A-4742-B13C-FB6460FD3503}" type="slidenum">
               <a:rPr lang="zh-CN" altLang="en-US" dirty="0"/>
+              <a:t>‹#›</a:t>
             </a:fld>
             <a:endParaRPr lang="zh-CN" altLang="en-US" dirty="0">
               <a:latin typeface="Arial" panose="020B0604020202020204" pitchFamily="34" charset="0"/>
@@ -2122,6 +2108,7 @@
             <a:pPr lvl="0"/>
             <a:fld id="{9A0DB2DC-4C9A-4742-B13C-FB6460FD3503}" type="slidenum">
               <a:rPr lang="zh-CN" altLang="en-US" dirty="0"/>
+              <a:t>‹#›</a:t>
             </a:fld>
             <a:endParaRPr lang="zh-CN" altLang="en-US" dirty="0">
               <a:latin typeface="Arial" panose="020B0604020202020204" pitchFamily="34" charset="0"/>
@@ -2179,10 +2166,9 @@
           </a:lstStyle>
           <a:p>
             <a:r>
-              <a:rPr lang="zh-CN" altLang="en-US" smtClean="0"/>
+              <a:rPr lang="zh-CN" altLang="en-US"/>
               <a:t>单击此处编辑母版标题样式</a:t>
             </a:r>
-            <a:endParaRPr lang="zh-CN" altLang="en-US"/>
           </a:p>
         </p:txBody>
       </p:sp>
@@ -2236,42 +2222,37 @@
           <a:p>
             <a:pPr lvl="0"/>
             <a:r>
-              <a:rPr lang="zh-CN" altLang="en-US" smtClean="0"/>
+              <a:rPr lang="zh-CN" altLang="en-US"/>
               <a:t>单击此处编辑母版文本样式</a:t>
             </a:r>
-            <a:endParaRPr lang="zh-CN" altLang="en-US" smtClean="0"/>
           </a:p>
           <a:p>
             <a:pPr lvl="1"/>
             <a:r>
-              <a:rPr lang="zh-CN" altLang="en-US" smtClean="0"/>
+              <a:rPr lang="zh-CN" altLang="en-US"/>
               <a:t>第二级</a:t>
             </a:r>
-            <a:endParaRPr lang="zh-CN" altLang="en-US" smtClean="0"/>
           </a:p>
           <a:p>
             <a:pPr lvl="2"/>
             <a:r>
-              <a:rPr lang="zh-CN" altLang="en-US" smtClean="0"/>
+              <a:rPr lang="zh-CN" altLang="en-US"/>
               <a:t>第三级</a:t>
             </a:r>
-            <a:endParaRPr lang="zh-CN" altLang="en-US" smtClean="0"/>
           </a:p>
           <a:p>
             <a:pPr lvl="3"/>
             <a:r>
-              <a:rPr lang="zh-CN" altLang="en-US" smtClean="0"/>
+              <a:rPr lang="zh-CN" altLang="en-US"/>
               <a:t>第四级</a:t>
             </a:r>
-            <a:endParaRPr lang="zh-CN" altLang="en-US" smtClean="0"/>
           </a:p>
           <a:p>
             <a:pPr lvl="4"/>
             <a:r>
-              <a:rPr lang="zh-CN" altLang="en-US" smtClean="0"/>
+              <a:rPr lang="zh-CN" altLang="en-US"/>
               <a:t>第五级</a:t>
             </a:r>
-            <a:endParaRPr lang="zh-CN" altLang="en-US"/>
           </a:p>
         </p:txBody>
       </p:sp>
@@ -2334,10 +2315,9 @@
           <a:p>
             <a:pPr lvl="0"/>
             <a:r>
-              <a:rPr lang="zh-CN" altLang="en-US" smtClean="0"/>
+              <a:rPr lang="zh-CN" altLang="en-US"/>
               <a:t>单击此处编辑母版文本样式</a:t>
             </a:r>
-            <a:endParaRPr lang="zh-CN" altLang="en-US" smtClean="0"/>
           </a:p>
         </p:txBody>
       </p:sp>
@@ -2401,6 +2381,7 @@
             <a:pPr lvl="0"/>
             <a:fld id="{9A0DB2DC-4C9A-4742-B13C-FB6460FD3503}" type="slidenum">
               <a:rPr lang="zh-CN" altLang="en-US" dirty="0"/>
+              <a:t>‹#›</a:t>
             </a:fld>
             <a:endParaRPr lang="zh-CN" altLang="en-US" dirty="0">
               <a:latin typeface="Arial" panose="020B0604020202020204" pitchFamily="34" charset="0"/>
@@ -2458,10 +2439,9 @@
           </a:lstStyle>
           <a:p>
             <a:r>
-              <a:rPr lang="zh-CN" altLang="en-US" smtClean="0"/>
+              <a:rPr lang="zh-CN" altLang="en-US"/>
               <a:t>单击此处编辑母版标题样式</a:t>
             </a:r>
-            <a:endParaRPr lang="zh-CN" altLang="en-US"/>
           </a:p>
         </p:txBody>
       </p:sp>
@@ -2585,10 +2565,9 @@
           <a:p>
             <a:pPr lvl="0"/>
             <a:r>
-              <a:rPr lang="zh-CN" altLang="en-US" smtClean="0"/>
+              <a:rPr lang="zh-CN" altLang="en-US"/>
               <a:t>单击此处编辑母版文本样式</a:t>
             </a:r>
-            <a:endParaRPr lang="zh-CN" altLang="en-US" smtClean="0"/>
           </a:p>
         </p:txBody>
       </p:sp>
@@ -2652,6 +2631,7 @@
             <a:pPr lvl="0"/>
             <a:fld id="{9A0DB2DC-4C9A-4742-B13C-FB6460FD3503}" type="slidenum">
               <a:rPr lang="zh-CN" altLang="en-US" dirty="0"/>
+              <a:t>‹#›</a:t>
             </a:fld>
             <a:endParaRPr lang="zh-CN" altLang="en-US" dirty="0">
               <a:latin typeface="Arial" panose="020B0604020202020204" pitchFamily="34" charset="0"/>
@@ -2689,7 +2669,14 @@
         <p:cNvGrpSpPr/>
         <p:nvPr/>
       </p:nvGrpSpPr>
-      <p:grpSpPr/>
+      <p:grpSpPr>
+        <a:xfrm>
+          <a:off x="0" y="0"/>
+          <a:ext cx="0" cy="0"/>
+          <a:chOff x="0" y="0"/>
+          <a:chExt cx="0" cy="0"/>
+        </a:xfrm>
+      </p:grpSpPr>
       <p:sp>
         <p:nvSpPr>
           <p:cNvPr id="12290" name="标题 12289"/>
@@ -2715,13 +2702,13 @@
         </p:spPr>
         <p:txBody>
           <a:bodyPr anchor="b" anchorCtr="0"/>
+          <a:lstStyle/>
           <a:p>
             <a:pPr lvl="0"/>
             <a:r>
               <a:rPr lang="zh-CN" altLang="en-US" dirty="0"/>
               <a:t>单击此处编辑母版标题样式</a:t>
             </a:r>
-            <a:endParaRPr lang="zh-CN" altLang="en-US" dirty="0"/>
           </a:p>
         </p:txBody>
       </p:sp>
@@ -2750,13 +2737,13 @@
         </p:spPr>
         <p:txBody>
           <a:bodyPr/>
+          <a:lstStyle/>
           <a:p>
             <a:pPr lvl="0"/>
             <a:r>
               <a:rPr lang="zh-CN" altLang="en-US" dirty="0"/>
               <a:t>单击此处编辑母版文本样式</a:t>
             </a:r>
-            <a:endParaRPr lang="zh-CN" altLang="en-US" dirty="0"/>
           </a:p>
           <a:p>
             <a:pPr lvl="1"/>
@@ -2764,7 +2751,6 @@
               <a:rPr lang="zh-CN" altLang="en-US" dirty="0"/>
               <a:t>第二级</a:t>
             </a:r>
-            <a:endParaRPr lang="zh-CN" altLang="en-US" dirty="0"/>
           </a:p>
           <a:p>
             <a:pPr lvl="2"/>
@@ -2772,7 +2758,6 @@
               <a:rPr lang="zh-CN" altLang="en-US" dirty="0"/>
               <a:t>第三级</a:t>
             </a:r>
-            <a:endParaRPr lang="zh-CN" altLang="en-US" dirty="0"/>
           </a:p>
           <a:p>
             <a:pPr lvl="3"/>
@@ -2780,7 +2765,6 @@
               <a:rPr lang="zh-CN" altLang="en-US" dirty="0"/>
               <a:t>第四级</a:t>
             </a:r>
-            <a:endParaRPr lang="zh-CN" altLang="en-US" dirty="0"/>
           </a:p>
           <a:p>
             <a:pPr lvl="4"/>
@@ -2788,7 +2772,6 @@
               <a:rPr lang="zh-CN" altLang="en-US" dirty="0"/>
               <a:t>第五级</a:t>
             </a:r>
-            <a:endParaRPr lang="zh-CN" altLang="en-US" dirty="0"/>
           </a:p>
         </p:txBody>
       </p:sp>
@@ -2812,6 +2795,7 @@
             </a:gdLst>
             <a:ahLst/>
             <a:cxnLst/>
+            <a:rect l="0" t="0" r="0" b="0"/>
             <a:pathLst>
               <a:path w="1000" h="1000" stroke="0">
                 <a:moveTo>
@@ -2853,6 +2837,7 @@
         </p:spPr>
         <p:txBody>
           <a:bodyPr/>
+          <a:lstStyle/>
           <a:p>
             <a:pPr lvl="0"/>
             <a:endParaRPr sz="2400" dirty="0">
@@ -2999,6 +2984,7 @@
             <a:pPr lvl="0"/>
             <a:fld id="{9A0DB2DC-4C9A-4742-B13C-FB6460FD3503}" type="slidenum">
               <a:rPr lang="zh-CN" altLang="en-US" dirty="0"/>
+              <a:t>‹#›</a:t>
             </a:fld>
             <a:endParaRPr lang="zh-CN" altLang="en-US" dirty="0">
               <a:latin typeface="Arial" panose="020B0604020202020204" pitchFamily="34" charset="0"/>
@@ -3459,7 +3445,14 @@
         <p:cNvGrpSpPr/>
         <p:nvPr/>
       </p:nvGrpSpPr>
-      <p:grpSpPr/>
+      <p:grpSpPr>
+        <a:xfrm>
+          <a:off x="0" y="0"/>
+          <a:ext cx="0" cy="0"/>
+          <a:chOff x="0" y="0"/>
+          <a:chExt cx="0" cy="0"/>
+        </a:xfrm>
+      </p:grpSpPr>
       <p:sp>
         <p:nvSpPr>
           <p:cNvPr id="4098" name="标题 4097"/>
@@ -3475,6 +3468,7 @@
         </p:spPr>
         <p:txBody>
           <a:bodyPr anchor="b" anchorCtr="0"/>
+          <a:lstStyle/>
           <a:p>
             <a:pPr defTabSz="914400">
               <a:buSzTx/>
@@ -3495,10 +3489,6 @@
               </a:rPr>
               <a:t>语言实验</a:t>
             </a:r>
-            <a:endParaRPr lang="zh-CN" altLang="en-US" kern="1200" baseline="0" dirty="0">
-              <a:latin typeface="Verdana" panose="020B0604030504040204" pitchFamily="34" charset="0"/>
-              <a:ea typeface="宋体" panose="02010600030101010101" pitchFamily="2" charset="-122"/>
-            </a:endParaRPr>
           </a:p>
         </p:txBody>
       </p:sp>
@@ -3517,6 +3507,7 @@
         </p:spPr>
         <p:txBody>
           <a:bodyPr anchor="t" anchorCtr="0"/>
+          <a:lstStyle/>
           <a:p>
             <a:pPr algn="ctr" defTabSz="914400">
               <a:buSzTx/>
@@ -3528,10 +3519,6 @@
               </a:rPr>
               <a:t>董薇</a:t>
             </a:r>
-            <a:endParaRPr lang="zh-CN" altLang="en-US" kern="1200" baseline="0" dirty="0">
-              <a:latin typeface="Verdana" panose="020B0604030504040204" pitchFamily="34" charset="0"/>
-              <a:ea typeface="宋体" panose="02010600030101010101" pitchFamily="2" charset="-122"/>
-            </a:endParaRPr>
           </a:p>
         </p:txBody>
       </p:sp>
@@ -3552,7 +3539,14 @@
         <p:cNvGrpSpPr/>
         <p:nvPr/>
       </p:nvGrpSpPr>
-      <p:grpSpPr/>
+      <p:grpSpPr>
+        <a:xfrm>
+          <a:off x="0" y="0"/>
+          <a:ext cx="0" cy="0"/>
+          <a:chOff x="0" y="0"/>
+          <a:chExt cx="0" cy="0"/>
+        </a:xfrm>
+      </p:grpSpPr>
       <p:sp>
         <p:nvSpPr>
           <p:cNvPr id="14338" name="标题 14337"/>
@@ -3568,12 +3562,12 @@
         </p:spPr>
         <p:txBody>
           <a:bodyPr anchor="b" anchorCtr="0"/>
+          <a:lstStyle/>
           <a:p>
             <a:r>
               <a:rPr lang="zh-CN" altLang="en-US" dirty="0"/>
               <a:t>实验题目</a:t>
             </a:r>
-            <a:endParaRPr lang="zh-CN" altLang="en-US" dirty="0"/>
           </a:p>
         </p:txBody>
       </p:sp>
@@ -3592,6 +3586,7 @@
         </p:spPr>
         <p:txBody>
           <a:bodyPr/>
+          <a:lstStyle/>
           <a:p>
             <a:pPr>
               <a:buNone/>
@@ -3610,7 +3605,6 @@
               <a:rPr lang="zh-CN" altLang="en-US" dirty="0"/>
               <a:t>语法及程序控制 </a:t>
             </a:r>
-            <a:endParaRPr lang="zh-CN" altLang="en-US" dirty="0"/>
           </a:p>
           <a:p>
             <a:pPr>
@@ -3624,7 +3618,6 @@
               <a:rPr lang="zh-CN" altLang="en-US" dirty="0"/>
               <a:t>统计文件中单词出现频度 </a:t>
             </a:r>
-            <a:endParaRPr lang="zh-CN" altLang="en-US" dirty="0"/>
           </a:p>
           <a:p>
             <a:pPr>
@@ -3638,7 +3631,6 @@
               <a:rPr lang="zh-CN" altLang="en-US" dirty="0"/>
               <a:t>记事本 </a:t>
             </a:r>
-            <a:endParaRPr lang="zh-CN" altLang="en-US" dirty="0"/>
           </a:p>
           <a:p>
             <a:pPr>
@@ -3660,7 +3652,6 @@
               <a:rPr lang="zh-CN" altLang="en-US" dirty="0"/>
               <a:t>编程 </a:t>
             </a:r>
-            <a:endParaRPr lang="zh-CN" altLang="en-US" dirty="0"/>
           </a:p>
           <a:p>
             <a:pPr>
@@ -3695,7 +3686,14 @@
         <p:cNvGrpSpPr/>
         <p:nvPr/>
       </p:nvGrpSpPr>
-      <p:grpSpPr/>
+      <p:grpSpPr>
+        <a:xfrm>
+          <a:off x="0" y="0"/>
+          <a:ext cx="0" cy="0"/>
+          <a:chOff x="0" y="0"/>
+          <a:chExt cx="0" cy="0"/>
+        </a:xfrm>
+      </p:grpSpPr>
       <p:sp>
         <p:nvSpPr>
           <p:cNvPr id="15362" name="标题 15361"/>
@@ -3711,20 +3709,20 @@
         </p:spPr>
         <p:txBody>
           <a:bodyPr anchor="b" anchorCtr="0"/>
+          <a:lstStyle/>
           <a:p>
             <a:r>
               <a:rPr lang="zh-CN" altLang="en-US" dirty="0"/>
               <a:t>实验一   </a:t>
             </a:r>
             <a:r>
-              <a:rPr lang="en-US" altLang="zh-CN"/>
+              <a:rPr lang="en-US" altLang="zh-CN" dirty="0"/>
               <a:t>Python</a:t>
             </a:r>
             <a:r>
               <a:rPr lang="zh-CN" altLang="en-US" dirty="0"/>
               <a:t>语法及程序控制 </a:t>
             </a:r>
-            <a:endParaRPr lang="zh-CN" altLang="en-US" dirty="0"/>
           </a:p>
         </p:txBody>
       </p:sp>
@@ -3743,6 +3741,7 @@
         </p:spPr>
         <p:txBody>
           <a:bodyPr/>
+          <a:lstStyle/>
           <a:p>
             <a:pPr>
               <a:buNone/>
@@ -3762,14 +3761,13 @@
               <a:t>      掌握</a:t>
             </a:r>
             <a:r>
-              <a:rPr lang="en-US" altLang="zh-CN"/>
+              <a:rPr lang="en-US" altLang="zh-CN" dirty="0"/>
               <a:t>python</a:t>
             </a:r>
             <a:r>
               <a:rPr lang="zh-CN" altLang="en-US" dirty="0"/>
               <a:t>基本语法和数据类型，掌握</a:t>
             </a:r>
-            <a:endParaRPr lang="zh-CN" altLang="en-US" dirty="0"/>
           </a:p>
           <a:p>
             <a:pPr>
@@ -3779,7 +3777,6 @@
               <a:rPr lang="zh-CN" altLang="en-US" dirty="0"/>
               <a:t>条件等语句的用法。</a:t>
             </a:r>
-            <a:endParaRPr lang="zh-CN" altLang="en-US" dirty="0"/>
           </a:p>
           <a:p>
             <a:pPr>
@@ -3805,7 +3802,6 @@
               <a:rPr lang="zh-CN" altLang="en-US" dirty="0"/>
               <a:t>      利用给定语法、数据结构及程序控制结构</a:t>
             </a:r>
-            <a:endParaRPr lang="zh-CN" altLang="en-US" dirty="0"/>
           </a:p>
           <a:p>
             <a:pPr>
@@ -3815,7 +3811,6 @@
               <a:rPr lang="zh-CN" altLang="en-US" dirty="0"/>
               <a:t>完成给定题目的程序设计任务。</a:t>
             </a:r>
-            <a:endParaRPr lang="zh-CN" altLang="en-US" dirty="0"/>
           </a:p>
         </p:txBody>
       </p:sp>
@@ -3836,7 +3831,14 @@
         <p:cNvGrpSpPr/>
         <p:nvPr/>
       </p:nvGrpSpPr>
-      <p:grpSpPr/>
+      <p:grpSpPr>
+        <a:xfrm>
+          <a:off x="0" y="0"/>
+          <a:ext cx="0" cy="0"/>
+          <a:chOff x="0" y="0"/>
+          <a:chExt cx="0" cy="0"/>
+        </a:xfrm>
+      </p:grpSpPr>
       <p:sp>
         <p:nvSpPr>
           <p:cNvPr id="16386" name="标题 16385"/>
@@ -3852,6 +3854,7 @@
         </p:spPr>
         <p:txBody>
           <a:bodyPr anchor="b" anchorCtr="0"/>
+          <a:lstStyle/>
           <a:p>
             <a:r>
               <a:rPr lang="zh-CN" altLang="en-US" dirty="0"/>
@@ -3865,7 +3868,6 @@
               <a:rPr lang="zh-CN" altLang="en-US" dirty="0"/>
               <a:t>语法及程序控制</a:t>
             </a:r>
-            <a:endParaRPr lang="zh-CN" altLang="en-US" dirty="0"/>
           </a:p>
         </p:txBody>
       </p:sp>
@@ -3884,6 +3886,7 @@
         </p:spPr>
         <p:txBody>
           <a:bodyPr/>
+          <a:lstStyle/>
           <a:p>
             <a:pPr>
               <a:buNone/>
@@ -3893,50 +3896,43 @@
               <a:t>实验内容：课上完成题目</a:t>
             </a:r>
             <a:r>
-              <a:rPr lang="zh-CN" altLang="en-US"/>
-              <a:t> </a:t>
-            </a:r>
-            <a:r>
-              <a:rPr lang="zh-CN" altLang="en-US" dirty="0"/>
-              <a:t>，共</a:t>
-            </a:r>
-            <a:r>
-              <a:rPr lang="en-US" altLang="zh-CN"/>
+              <a:rPr lang="zh-CN" altLang="en-US" dirty="0"/>
+              <a:t> ，共</a:t>
+            </a:r>
+            <a:r>
+              <a:rPr lang="en-US" altLang="zh-CN" dirty="0"/>
               <a:t>6</a:t>
             </a:r>
             <a:r>
               <a:rPr lang="zh-CN" altLang="en-US" dirty="0"/>
               <a:t>道上机题。</a:t>
             </a:r>
-            <a:endParaRPr lang="zh-CN" altLang="en-US" dirty="0"/>
           </a:p>
           <a:p>
             <a:pPr>
               <a:buNone/>
             </a:pPr>
             <a:r>
-              <a:rPr lang="zh-CN" altLang="en-US"/>
+              <a:rPr lang="zh-CN" altLang="en-US" dirty="0"/>
               <a:t>      </a:t>
             </a:r>
-            <a:endParaRPr lang="zh-CN" altLang="en-US"/>
           </a:p>
           <a:p>
             <a:pPr>
               <a:buNone/>
             </a:pPr>
             <a:r>
-              <a:rPr lang="zh-CN" altLang="en-US"/>
+              <a:rPr lang="zh-CN" altLang="en-US" dirty="0"/>
               <a:t>      </a:t>
             </a:r>
             <a:r>
-              <a:rPr lang="en-US" altLang="zh-CN"/>
+              <a:rPr lang="en-US" altLang="zh-CN" dirty="0"/>
               <a:t>1.</a:t>
             </a:r>
             <a:r>
               <a:rPr lang="zh-CN" altLang="en-US" dirty="0"/>
               <a:t>输入平面上的两个点，计算两点间的距</a:t>
             </a:r>
-            <a:endParaRPr lang="zh-CN" altLang="en-US" dirty="0"/>
           </a:p>
           <a:p>
             <a:pPr>
@@ -3946,7 +3942,6 @@
               <a:rPr lang="zh-CN" altLang="en-US" dirty="0"/>
               <a:t>离。根据解析几何知识，两点间距离可由两点</a:t>
             </a:r>
-            <a:endParaRPr lang="zh-CN" altLang="en-US" dirty="0"/>
           </a:p>
           <a:p>
             <a:pPr>
@@ -3956,17 +3951,15 @@
               <a:rPr lang="zh-CN" altLang="en-US" dirty="0"/>
               <a:t>间的距离公式计算求得。 </a:t>
             </a:r>
-            <a:endParaRPr lang="zh-CN" altLang="en-US" dirty="0"/>
           </a:p>
           <a:p>
             <a:pPr>
               <a:buNone/>
             </a:pPr>
             <a:r>
-              <a:rPr lang="zh-CN" altLang="en-US"/>
+              <a:rPr lang="zh-CN" altLang="en-US" dirty="0"/>
               <a:t>      </a:t>
             </a:r>
-            <a:endParaRPr lang="zh-CN" altLang="en-US" dirty="0"/>
           </a:p>
         </p:txBody>
       </p:sp>
@@ -3987,7 +3980,14 @@
         <p:cNvGrpSpPr/>
         <p:nvPr/>
       </p:nvGrpSpPr>
-      <p:grpSpPr/>
+      <p:grpSpPr>
+        <a:xfrm>
+          <a:off x="0" y="0"/>
+          <a:ext cx="0" cy="0"/>
+          <a:chOff x="0" y="0"/>
+          <a:chExt cx="0" cy="0"/>
+        </a:xfrm>
+      </p:grpSpPr>
       <p:sp>
         <p:nvSpPr>
           <p:cNvPr id="17410" name="标题 17409"/>
@@ -4003,6 +4003,7 @@
         </p:spPr>
         <p:txBody>
           <a:bodyPr anchor="b" anchorCtr="0"/>
+          <a:lstStyle/>
           <a:p>
             <a:r>
               <a:rPr lang="zh-CN" altLang="en-US" dirty="0"/>
@@ -4016,7 +4017,6 @@
               <a:rPr lang="zh-CN" altLang="en-US" dirty="0"/>
               <a:t>语法及程序控制</a:t>
             </a:r>
-            <a:endParaRPr lang="zh-CN" altLang="en-US" dirty="0"/>
           </a:p>
         </p:txBody>
       </p:sp>
@@ -4035,19 +4035,19 @@
         </p:spPr>
         <p:txBody>
           <a:bodyPr/>
+          <a:lstStyle/>
           <a:p>
             <a:pPr>
               <a:buNone/>
             </a:pPr>
             <a:r>
-              <a:rPr lang="en-US" altLang="zh-CN"/>
+              <a:rPr lang="en-US" altLang="zh-CN" dirty="0"/>
               <a:t>       2.</a:t>
             </a:r>
             <a:r>
               <a:rPr lang="zh-CN" altLang="en-US" dirty="0"/>
               <a:t>计算昨天和明天的日期。需要获得日期</a:t>
             </a:r>
-            <a:endParaRPr lang="zh-CN" altLang="en-US" dirty="0"/>
           </a:p>
           <a:p>
             <a:pPr>
@@ -4058,25 +4058,24 @@
               <a:t>型数据今天的日期，可通过</a:t>
             </a:r>
             <a:r>
-              <a:rPr lang="en-US" altLang="zh-CN" err="1"/>
+              <a:rPr lang="en-US" altLang="zh-CN" dirty="0" err="1"/>
               <a:t>datatime</a:t>
             </a:r>
             <a:r>
               <a:rPr lang="zh-CN" altLang="en-US" dirty="0"/>
               <a:t>模块中的</a:t>
             </a:r>
-            <a:endParaRPr lang="zh-CN" altLang="en-US" dirty="0"/>
           </a:p>
           <a:p>
             <a:pPr>
               <a:buNone/>
             </a:pPr>
             <a:r>
-              <a:rPr lang="en-US" altLang="zh-CN" err="1"/>
+              <a:rPr lang="en-US" altLang="zh-CN" dirty="0" err="1"/>
               <a:t>data.today</a:t>
             </a:r>
             <a:r>
-              <a:rPr lang="en-US" altLang="zh-CN"/>
+              <a:rPr lang="en-US" altLang="zh-CN" dirty="0"/>
               <a:t>()</a:t>
             </a:r>
             <a:r>
@@ -4084,14 +4083,13 @@
               <a:t>方法获得。通过</a:t>
             </a:r>
             <a:r>
-              <a:rPr lang="en-US" altLang="zh-CN" err="1"/>
+              <a:rPr lang="en-US" altLang="zh-CN" dirty="0" err="1"/>
               <a:t>datatime</a:t>
             </a:r>
             <a:r>
               <a:rPr lang="zh-CN" altLang="en-US" dirty="0"/>
               <a:t>模块</a:t>
             </a:r>
-            <a:endParaRPr lang="zh-CN" altLang="en-US" dirty="0"/>
           </a:p>
           <a:p>
             <a:pPr>
@@ -4102,11 +4100,11 @@
               <a:t>中的</a:t>
             </a:r>
             <a:r>
-              <a:rPr lang="en-US" altLang="zh-CN" err="1"/>
+              <a:rPr lang="en-US" altLang="zh-CN" dirty="0" err="1"/>
               <a:t>timedelta</a:t>
             </a:r>
             <a:r>
-              <a:rPr lang="en-US" altLang="zh-CN"/>
+              <a:rPr lang="en-US" altLang="zh-CN" dirty="0"/>
               <a:t>()</a:t>
             </a:r>
             <a:r>
@@ -4114,14 +4112,13 @@
               <a:t>方法获得</a:t>
             </a:r>
             <a:r>
-              <a:rPr lang="en-US" altLang="zh-CN"/>
+              <a:rPr lang="en-US" altLang="zh-CN" dirty="0"/>
               <a:t>1</a:t>
             </a:r>
             <a:r>
               <a:rPr lang="zh-CN" altLang="en-US" dirty="0"/>
               <a:t>天的日期类型，与</a:t>
             </a:r>
-            <a:endParaRPr lang="zh-CN" altLang="en-US" dirty="0"/>
           </a:p>
           <a:p>
             <a:pPr>
@@ -4131,7 +4128,6 @@
               <a:rPr lang="zh-CN" altLang="en-US" dirty="0"/>
               <a:t>今天的日期进行运算。</a:t>
             </a:r>
-            <a:endParaRPr lang="zh-CN" altLang="en-US" dirty="0"/>
           </a:p>
           <a:p>
             <a:pPr>
@@ -4158,7 +4154,14 @@
         <p:cNvGrpSpPr/>
         <p:nvPr/>
       </p:nvGrpSpPr>
-      <p:grpSpPr/>
+      <p:grpSpPr>
+        <a:xfrm>
+          <a:off x="0" y="0"/>
+          <a:ext cx="0" cy="0"/>
+          <a:chOff x="0" y="0"/>
+          <a:chExt cx="0" cy="0"/>
+        </a:xfrm>
+      </p:grpSpPr>
       <p:sp>
         <p:nvSpPr>
           <p:cNvPr id="18434" name="标题 18433"/>
@@ -4174,6 +4177,7 @@
         </p:spPr>
         <p:txBody>
           <a:bodyPr anchor="b" anchorCtr="0"/>
+          <a:lstStyle/>
           <a:p>
             <a:r>
               <a:rPr lang="zh-CN" altLang="en-US" dirty="0"/>
@@ -4187,7 +4191,6 @@
               <a:rPr lang="zh-CN" altLang="en-US" dirty="0"/>
               <a:t>语法及程序控制</a:t>
             </a:r>
-            <a:endParaRPr lang="zh-CN" altLang="en-US" dirty="0"/>
           </a:p>
         </p:txBody>
       </p:sp>
@@ -4206,19 +4209,19 @@
         </p:spPr>
         <p:txBody>
           <a:bodyPr/>
+          <a:lstStyle/>
           <a:p>
             <a:pPr>
               <a:buNone/>
             </a:pPr>
             <a:r>
-              <a:rPr lang="en-US" altLang="zh-CN"/>
+              <a:rPr lang="en-US" altLang="zh-CN" dirty="0"/>
               <a:t>      3.</a:t>
             </a:r>
             <a:r>
               <a:rPr lang="zh-CN" altLang="en-US" dirty="0"/>
               <a:t>从键盘输入圆的半径，如果半径大于等</a:t>
             </a:r>
-            <a:endParaRPr lang="zh-CN" altLang="en-US" dirty="0"/>
           </a:p>
           <a:p>
             <a:pPr>
@@ -4229,32 +4232,30 @@
               <a:t>于</a:t>
             </a:r>
             <a:r>
-              <a:rPr lang="en-US" altLang="zh-CN"/>
+              <a:rPr lang="en-US" altLang="zh-CN" dirty="0"/>
               <a:t>0</a:t>
             </a:r>
             <a:r>
               <a:rPr lang="zh-CN" altLang="en-US" dirty="0"/>
               <a:t>，计算并输出圆的面积。</a:t>
             </a:r>
-            <a:endParaRPr lang="zh-CN" altLang="en-US" dirty="0"/>
           </a:p>
           <a:p>
             <a:pPr>
               <a:buNone/>
             </a:pPr>
             <a:r>
-              <a:rPr lang="zh-CN" altLang="en-US"/>
+              <a:rPr lang="zh-CN" altLang="en-US" dirty="0"/>
               <a:t>      </a:t>
             </a:r>
             <a:r>
-              <a:rPr lang="en-US" altLang="zh-CN"/>
+              <a:rPr lang="en-US" altLang="zh-CN" dirty="0"/>
               <a:t>4.</a:t>
             </a:r>
             <a:r>
               <a:rPr lang="zh-CN" altLang="en-US" dirty="0"/>
               <a:t>输入三角形的三边长，判断是否能够组</a:t>
             </a:r>
-            <a:endParaRPr lang="zh-CN" altLang="en-US" dirty="0"/>
           </a:p>
           <a:p>
             <a:pPr>
@@ -4264,7 +4265,6 @@
               <a:rPr lang="zh-CN" altLang="en-US" dirty="0"/>
               <a:t>成三角形；如果可以构成三角形，输出它的面</a:t>
             </a:r>
-            <a:endParaRPr lang="zh-CN" altLang="en-US" dirty="0"/>
           </a:p>
           <a:p>
             <a:pPr>
@@ -4274,7 +4274,6 @@
               <a:rPr lang="zh-CN" altLang="en-US" dirty="0"/>
               <a:t>积和三角形的类型，类型包括：等腰、等边、</a:t>
             </a:r>
-            <a:endParaRPr lang="zh-CN" altLang="en-US" dirty="0"/>
           </a:p>
           <a:p>
             <a:pPr>
@@ -4284,7 +4283,6 @@
               <a:rPr lang="zh-CN" altLang="en-US" dirty="0"/>
               <a:t>直角、普通。</a:t>
             </a:r>
-            <a:endParaRPr lang="zh-CN" altLang="en-US" dirty="0"/>
           </a:p>
         </p:txBody>
       </p:sp>
@@ -4305,7 +4303,14 @@
         <p:cNvGrpSpPr/>
         <p:nvPr/>
       </p:nvGrpSpPr>
-      <p:grpSpPr/>
+      <p:grpSpPr>
+        <a:xfrm>
+          <a:off x="0" y="0"/>
+          <a:ext cx="0" cy="0"/>
+          <a:chOff x="0" y="0"/>
+          <a:chExt cx="0" cy="0"/>
+        </a:xfrm>
+      </p:grpSpPr>
       <p:sp>
         <p:nvSpPr>
           <p:cNvPr id="19458" name="标题 19457"/>
@@ -4321,6 +4326,7 @@
         </p:spPr>
         <p:txBody>
           <a:bodyPr anchor="b" anchorCtr="0"/>
+          <a:lstStyle/>
           <a:p>
             <a:r>
               <a:rPr lang="zh-CN" altLang="en-US" dirty="0"/>
@@ -4334,7 +4340,6 @@
               <a:rPr lang="zh-CN" altLang="en-US" dirty="0"/>
               <a:t>语法及程序控制</a:t>
             </a:r>
-            <a:endParaRPr lang="zh-CN" altLang="en-US" dirty="0"/>
           </a:p>
         </p:txBody>
       </p:sp>
@@ -4353,19 +4358,19 @@
         </p:spPr>
         <p:txBody>
           <a:bodyPr/>
+          <a:lstStyle/>
           <a:p>
             <a:pPr>
               <a:buNone/>
             </a:pPr>
             <a:r>
-              <a:rPr lang="en-US" altLang="zh-CN"/>
+              <a:rPr lang="en-US" altLang="zh-CN" dirty="0"/>
               <a:t>      5.</a:t>
             </a:r>
             <a:r>
               <a:rPr lang="zh-CN" altLang="en-US" dirty="0"/>
               <a:t>输入一个列表，求出列表中所有正偶数</a:t>
             </a:r>
-            <a:endParaRPr lang="zh-CN" altLang="en-US" dirty="0"/>
           </a:p>
           <a:p>
             <a:pPr>
@@ -4375,18 +4380,17 @@
               <a:rPr lang="zh-CN" altLang="en-US" dirty="0"/>
               <a:t>之和。</a:t>
             </a:r>
-            <a:endParaRPr lang="zh-CN" altLang="en-US" dirty="0"/>
           </a:p>
           <a:p>
             <a:pPr>
               <a:buNone/>
             </a:pPr>
             <a:r>
-              <a:rPr lang="zh-CN" altLang="en-US"/>
+              <a:rPr lang="zh-CN" altLang="en-US" dirty="0"/>
               <a:t>      </a:t>
             </a:r>
             <a:r>
-              <a:rPr lang="en-US" altLang="zh-CN"/>
+              <a:rPr lang="en-US" altLang="zh-CN" dirty="0"/>
               <a:t>6.</a:t>
             </a:r>
             <a:r>
@@ -4394,7 +4398,7 @@
               <a:t>求</a:t>
             </a:r>
             <a:r>
-              <a:rPr lang="en-US" altLang="zh-CN"/>
+              <a:rPr lang="en-US" altLang="zh-CN" dirty="0"/>
               <a:t>1~100</a:t>
             </a:r>
             <a:r>
@@ -4402,14 +4406,13 @@
               <a:t>之间能被</a:t>
             </a:r>
             <a:r>
-              <a:rPr lang="en-US" altLang="zh-CN"/>
+              <a:rPr lang="en-US" altLang="zh-CN" dirty="0"/>
               <a:t>7</a:t>
             </a:r>
             <a:r>
               <a:rPr lang="zh-CN" altLang="en-US" dirty="0"/>
               <a:t>整除，但不能同时</a:t>
             </a:r>
-            <a:endParaRPr lang="zh-CN" altLang="en-US" dirty="0"/>
           </a:p>
           <a:p>
             <a:pPr>
@@ -4420,14 +4423,13 @@
               <a:t>被</a:t>
             </a:r>
             <a:r>
-              <a:rPr lang="en-US" altLang="zh-CN"/>
+              <a:rPr lang="en-US" altLang="zh-CN" dirty="0"/>
               <a:t>5</a:t>
             </a:r>
             <a:r>
               <a:rPr lang="zh-CN" altLang="en-US" dirty="0"/>
               <a:t>整除的所有整数。</a:t>
             </a:r>
-            <a:endParaRPr lang="zh-CN" altLang="en-US" dirty="0"/>
           </a:p>
         </p:txBody>
       </p:sp>
@@ -4448,7 +4450,14 @@
         <p:cNvGrpSpPr/>
         <p:nvPr/>
       </p:nvGrpSpPr>
-      <p:grpSpPr/>
+      <p:grpSpPr>
+        <a:xfrm>
+          <a:off x="0" y="0"/>
+          <a:ext cx="0" cy="0"/>
+          <a:chOff x="0" y="0"/>
+          <a:chExt cx="0" cy="0"/>
+        </a:xfrm>
+      </p:grpSpPr>
       <p:sp>
         <p:nvSpPr>
           <p:cNvPr id="20482" name="标题 20481"/>
@@ -4464,6 +4473,7 @@
         </p:spPr>
         <p:txBody>
           <a:bodyPr anchor="b" anchorCtr="0"/>
+          <a:lstStyle/>
           <a:p>
             <a:r>
               <a:rPr lang="zh-CN" altLang="en-US" dirty="0"/>
@@ -4477,7 +4487,6 @@
               <a:rPr lang="zh-CN" altLang="en-US" dirty="0"/>
               <a:t>语法及程序控制</a:t>
             </a:r>
-            <a:endParaRPr lang="zh-CN" altLang="en-US" dirty="0"/>
           </a:p>
         </p:txBody>
       </p:sp>
@@ -4496,6 +4505,7 @@
         </p:spPr>
         <p:txBody>
           <a:bodyPr/>
+          <a:lstStyle/>
           <a:p>
             <a:pPr>
               <a:lnSpc>
@@ -4507,7 +4517,6 @@
               <a:rPr lang="zh-CN" altLang="en-US" b="1" dirty="0"/>
               <a:t>扩展上机作业：</a:t>
             </a:r>
-            <a:endParaRPr lang="zh-CN" altLang="en-US" b="1" dirty="0"/>
           </a:p>
           <a:p>
             <a:pPr>
@@ -4517,14 +4526,13 @@
               <a:buNone/>
             </a:pPr>
             <a:r>
-              <a:rPr lang="en-US" altLang="zh-CN"/>
+              <a:rPr lang="en-US" altLang="zh-CN" dirty="0"/>
               <a:t>1.</a:t>
             </a:r>
             <a:r>
               <a:rPr lang="zh-CN" altLang="en-US" dirty="0"/>
               <a:t>输入长方形的长和宽，计算面积，输出面积。</a:t>
             </a:r>
-            <a:endParaRPr lang="zh-CN" altLang="en-US" dirty="0"/>
           </a:p>
           <a:p>
             <a:pPr>
@@ -4534,7 +4542,7 @@
               <a:buNone/>
             </a:pPr>
             <a:r>
-              <a:rPr lang="en-US" altLang="zh-CN"/>
+              <a:rPr lang="en-US" altLang="zh-CN" dirty="0"/>
               <a:t>2.</a:t>
             </a:r>
             <a:r>
@@ -4542,7 +4550,7 @@
               <a:t>输入表示年月日的</a:t>
             </a:r>
             <a:r>
-              <a:rPr lang="en-US" altLang="zh-CN"/>
+              <a:rPr lang="en-US" altLang="zh-CN" dirty="0"/>
               <a:t>8</a:t>
             </a:r>
             <a:r>
@@ -4550,14 +4558,13 @@
               <a:t>位数，如</a:t>
             </a:r>
             <a:r>
-              <a:rPr lang="en-US" altLang="zh-CN"/>
+              <a:rPr lang="en-US" altLang="zh-CN" dirty="0"/>
               <a:t>20100722</a:t>
             </a:r>
             <a:r>
               <a:rPr lang="zh-CN" altLang="en-US" dirty="0"/>
               <a:t>，</a:t>
             </a:r>
-            <a:endParaRPr lang="zh-CN" altLang="en-US" dirty="0"/>
           </a:p>
           <a:p>
             <a:pPr>
@@ -4570,7 +4577,6 @@
               <a:rPr lang="zh-CN" altLang="en-US" dirty="0"/>
               <a:t>输出年、月、日。</a:t>
             </a:r>
-            <a:endParaRPr lang="zh-CN" altLang="en-US" dirty="0"/>
           </a:p>
           <a:p>
             <a:pPr>
@@ -4580,7 +4586,7 @@
               <a:buNone/>
             </a:pPr>
             <a:r>
-              <a:rPr lang="en-US" altLang="zh-CN"/>
+              <a:rPr lang="en-US" altLang="zh-CN" dirty="0"/>
               <a:t>3.</a:t>
             </a:r>
             <a:r>
@@ -4588,7 +4594,7 @@
               <a:t>输入平面上第</a:t>
             </a:r>
             <a:r>
-              <a:rPr lang="en-US" altLang="zh-CN"/>
+              <a:rPr lang="en-US" altLang="zh-CN" dirty="0"/>
               <a:t>1</a:t>
             </a:r>
             <a:r>
@@ -4596,7 +4602,7 @@
               <a:t>象限</a:t>
             </a:r>
             <a:r>
-              <a:rPr lang="en-US" altLang="zh-CN"/>
+              <a:rPr lang="en-US" altLang="zh-CN" dirty="0"/>
               <a:t>1</a:t>
             </a:r>
             <a:r>
@@ -4604,7 +4610,7 @@
               <a:t>个点，第</a:t>
             </a:r>
             <a:r>
-              <a:rPr lang="en-US" altLang="zh-CN"/>
+              <a:rPr lang="en-US" altLang="zh-CN" dirty="0"/>
               <a:t>3</a:t>
             </a:r>
             <a:r>
@@ -4612,14 +4618,13 @@
               <a:t>象限</a:t>
             </a:r>
             <a:r>
-              <a:rPr lang="en-US" altLang="zh-CN"/>
+              <a:rPr lang="en-US" altLang="zh-CN" dirty="0"/>
               <a:t>1</a:t>
             </a:r>
             <a:r>
               <a:rPr lang="zh-CN" altLang="en-US" dirty="0"/>
               <a:t>个点，计算两点间的距离。</a:t>
             </a:r>
-            <a:endParaRPr lang="zh-CN" altLang="en-US" dirty="0"/>
           </a:p>
           <a:p>
             <a:pPr>
@@ -4629,7 +4634,7 @@
               <a:buNone/>
             </a:pPr>
             <a:r>
-              <a:rPr lang="en-US" altLang="zh-CN"/>
+              <a:rPr lang="en-US" altLang="zh-CN" dirty="0"/>
               <a:t>4. </a:t>
             </a:r>
             <a:r>
@@ -4637,18 +4642,17 @@
               <a:t>输入两个点，建立起直线方程</a:t>
             </a:r>
             <a:r>
-              <a:rPr lang="en-US" altLang="zh-CN"/>
+              <a:rPr lang="en-US" altLang="zh-CN" dirty="0"/>
               <a:t>y=</a:t>
             </a:r>
             <a:r>
-              <a:rPr lang="en-US" altLang="zh-CN" err="1"/>
+              <a:rPr lang="en-US" altLang="zh-CN" dirty="0" err="1"/>
               <a:t>kx+b</a:t>
             </a:r>
             <a:r>
               <a:rPr lang="zh-CN" altLang="en-US" dirty="0"/>
               <a:t>。输</a:t>
             </a:r>
-            <a:endParaRPr lang="zh-CN" altLang="en-US" dirty="0"/>
           </a:p>
           <a:p>
             <a:pPr>
@@ -4661,7 +4665,6 @@
               <a:rPr lang="zh-CN" altLang="en-US" dirty="0"/>
               <a:t>入第三个点，求点到直线的距离。</a:t>
             </a:r>
-            <a:endParaRPr lang="zh-CN" altLang="en-US" dirty="0"/>
           </a:p>
         </p:txBody>
       </p:sp>
@@ -4682,7 +4685,14 @@
         <p:cNvGrpSpPr/>
         <p:nvPr/>
       </p:nvGrpSpPr>
-      <p:grpSpPr/>
+      <p:grpSpPr>
+        <a:xfrm>
+          <a:off x="0" y="0"/>
+          <a:ext cx="0" cy="0"/>
+          <a:chOff x="0" y="0"/>
+          <a:chExt cx="0" cy="0"/>
+        </a:xfrm>
+      </p:grpSpPr>
       <p:sp>
         <p:nvSpPr>
           <p:cNvPr id="21506" name="标题 21505"/>
@@ -4698,6 +4708,7 @@
         </p:spPr>
         <p:txBody>
           <a:bodyPr anchor="b" anchorCtr="0"/>
+          <a:lstStyle/>
           <a:p>
             <a:r>
               <a:rPr lang="zh-CN" altLang="en-US" dirty="0"/>
@@ -4711,7 +4722,6 @@
               <a:rPr lang="zh-CN" altLang="en-US" dirty="0"/>
               <a:t>语法及程序控制</a:t>
             </a:r>
-            <a:endParaRPr lang="zh-CN" altLang="en-US" dirty="0"/>
           </a:p>
         </p:txBody>
       </p:sp>
@@ -4730,6 +4740,7 @@
         </p:spPr>
         <p:txBody>
           <a:bodyPr/>
+          <a:lstStyle/>
           <a:p>
             <a:pPr eaLnBrk="0" hangingPunct="0">
               <a:spcBef>
@@ -4740,7 +4751,7 @@
               <a:buNone/>
             </a:pPr>
             <a:r>
-              <a:rPr lang="en-US" altLang="zh-CN"/>
+              <a:rPr lang="en-US" altLang="zh-CN" dirty="0"/>
               <a:t>5.</a:t>
             </a:r>
             <a:r>
@@ -4748,7 +4759,7 @@
               <a:t>求</a:t>
             </a:r>
             <a:r>
-              <a:rPr lang="en-US" altLang="zh-CN"/>
+              <a:rPr lang="en-US" altLang="zh-CN" dirty="0"/>
               <a:t>1</a:t>
             </a:r>
             <a:r>
@@ -4756,14 +4767,13 @@
               <a:t>～</a:t>
             </a:r>
             <a:r>
-              <a:rPr lang="en-US" altLang="zh-CN"/>
+              <a:rPr lang="en-US" altLang="zh-CN" dirty="0"/>
               <a:t>100</a:t>
             </a:r>
             <a:r>
               <a:rPr lang="zh-CN" altLang="en-US" dirty="0"/>
               <a:t>之间所有的素数，并统计素数的</a:t>
             </a:r>
-            <a:endParaRPr lang="zh-CN" altLang="en-US" dirty="0"/>
           </a:p>
           <a:p>
             <a:pPr eaLnBrk="0" hangingPunct="0">
@@ -4778,7 +4788,6 @@
               <a:rPr lang="zh-CN" altLang="en-US" dirty="0"/>
               <a:t>个数。</a:t>
             </a:r>
-            <a:endParaRPr lang="zh-CN" altLang="en-US" dirty="0"/>
           </a:p>
           <a:p>
             <a:pPr eaLnBrk="0" hangingPunct="0">
@@ -4790,7 +4799,7 @@
               <a:buNone/>
             </a:pPr>
             <a:r>
-              <a:rPr lang="en-US" altLang="zh-CN"/>
+              <a:rPr lang="en-US" altLang="zh-CN" dirty="0"/>
               <a:t>6.</a:t>
             </a:r>
             <a:r>
@@ -4798,14 +4807,13 @@
               <a:t>编程求斐波拉契数列的前</a:t>
             </a:r>
             <a:r>
-              <a:rPr lang="en-US" altLang="zh-CN"/>
+              <a:rPr lang="en-US" altLang="zh-CN" dirty="0"/>
               <a:t>20</a:t>
             </a:r>
             <a:r>
               <a:rPr lang="zh-CN" altLang="en-US" dirty="0"/>
               <a:t>项，已知该数列</a:t>
             </a:r>
-            <a:endParaRPr lang="zh-CN" altLang="en-US" dirty="0"/>
           </a:p>
           <a:p>
             <a:pPr eaLnBrk="0" hangingPunct="0">
@@ -4821,7 +4829,7 @@
               <a:t>的第一、二项分别是</a:t>
             </a:r>
             <a:r>
-              <a:rPr lang="en-US" altLang="zh-CN"/>
+              <a:rPr lang="en-US" altLang="zh-CN" dirty="0"/>
               <a:t>0</a:t>
             </a:r>
             <a:r>
@@ -4829,14 +4837,13 @@
               <a:t>、</a:t>
             </a:r>
             <a:r>
-              <a:rPr lang="en-US" altLang="zh-CN"/>
+              <a:rPr lang="en-US" altLang="zh-CN" dirty="0"/>
               <a:t>1</a:t>
             </a:r>
             <a:r>
               <a:rPr lang="zh-CN" altLang="en-US" dirty="0"/>
               <a:t>，从第三项开始，每</a:t>
             </a:r>
-            <a:endParaRPr lang="zh-CN" altLang="en-US" dirty="0"/>
           </a:p>
           <a:p>
             <a:pPr eaLnBrk="0" hangingPunct="0">
@@ -4852,10 +4859,9 @@
               <a:t>一项都是前两项之和。例如：</a:t>
             </a:r>
             <a:r>
-              <a:rPr lang="en-US" altLang="zh-CN"/>
+              <a:rPr lang="en-US" altLang="zh-CN" dirty="0"/>
               <a:t>0, 1, 1, 2, 3, </a:t>
             </a:r>
-            <a:endParaRPr lang="en-US" altLang="zh-CN"/>
           </a:p>
           <a:p>
             <a:pPr eaLnBrk="0" hangingPunct="0">
@@ -4867,16 +4873,16 @@
               <a:buNone/>
             </a:pPr>
             <a:r>
-              <a:rPr lang="en-US" altLang="zh-CN"/>
+              <a:rPr lang="en-US" altLang="zh-CN" dirty="0"/>
               <a:t>5, 8, 13</a:t>
             </a:r>
             <a:r>
-              <a:rPr lang="en-US" altLang="zh-CN">
+              <a:rPr lang="en-US" altLang="zh-CN" dirty="0">
                 <a:latin typeface="Arial" panose="020B0604020202020204" pitchFamily="34" charset="0"/>
               </a:rPr>
               <a:t>……</a:t>
             </a:r>
-            <a:endParaRPr lang="en-US" altLang="zh-CN"/>
+            <a:endParaRPr lang="en-US" altLang="zh-CN" dirty="0"/>
           </a:p>
           <a:p>
             <a:endParaRPr lang="en-US" altLang="zh-CN" dirty="0"/>
@@ -4892,7 +4898,7 @@
 </file>
 
 <file path=ppt/tags/tag1.xml><?xml version="1.0" encoding="utf-8"?>
-<p:tagLst xmlns:p="http://schemas.openxmlformats.org/presentationml/2006/main">
+<p:tagLst xmlns:a="http://schemas.openxmlformats.org/drawingml/2006/main" xmlns:r="http://schemas.openxmlformats.org/officeDocument/2006/relationships" xmlns:p="http://schemas.openxmlformats.org/presentationml/2006/main">
   <p:tag name="COMMONDATA" val="eyJoZGlkIjoiMWE2MTgxZmY3NWM2NzlmZDViYzc5OTU3YmJkMWI2NDAifQ=="/>
 </p:tagLst>
 </file>
@@ -5088,6 +5094,7 @@
       </a:bgFillStyleLst>
     </a:fmtScheme>
   </a:themeElements>
+  <a:objectDefaults/>
   <a:extraClrSchemeLst>
     <a:extraClrScheme>
       <a:clrScheme name="">

</xml_diff>